<commit_message>
Updates to several items in Chap/Start
Updated all -Intro presentations, and renamed them to "generic" names like IT-Intro, etc.. Old versions moved to "Old" folder.
Also updated other presentations and the Start document itself (only minor changes)
</commit_message>
<xml_diff>
--- a/Chap/Start/Presentations/CodeOrganisation.pptx
+++ b/Chap/Start/Presentations/CodeOrganisation.pptx
@@ -10,12 +10,13 @@
     <p:sldId id="328" r:id="rId4"/>
     <p:sldId id="329" r:id="rId5"/>
     <p:sldId id="331" r:id="rId6"/>
-    <p:sldId id="332" r:id="rId7"/>
-    <p:sldId id="333" r:id="rId8"/>
-    <p:sldId id="334" r:id="rId9"/>
-    <p:sldId id="335" r:id="rId10"/>
-    <p:sldId id="336" r:id="rId11"/>
-    <p:sldId id="337" r:id="rId12"/>
+    <p:sldId id="338" r:id="rId7"/>
+    <p:sldId id="332" r:id="rId8"/>
+    <p:sldId id="333" r:id="rId9"/>
+    <p:sldId id="334" r:id="rId10"/>
+    <p:sldId id="335" r:id="rId11"/>
+    <p:sldId id="336" r:id="rId12"/>
+    <p:sldId id="337" r:id="rId13"/>
   </p:sldIdLst>
   <p:sldSz cx="12192000" cy="6858000"/>
   <p:notesSz cx="6858000" cy="9144000"/>
@@ -251,7 +252,7 @@
           <a:p>
             <a:fld id="{E15B7D8E-2A20-4C0E-991C-872DBB7459A8}" type="datetimeFigureOut">
               <a:rPr lang="da-DK" smtClean="0"/>
-              <a:t>20-08-2022</a:t>
+              <a:t>20-08-2023</a:t>
             </a:fld>
             <a:endParaRPr lang="da-DK"/>
           </a:p>
@@ -419,7 +420,7 @@
           <a:p>
             <a:fld id="{E15B7D8E-2A20-4C0E-991C-872DBB7459A8}" type="datetimeFigureOut">
               <a:rPr lang="da-DK" smtClean="0"/>
-              <a:t>20-08-2022</a:t>
+              <a:t>20-08-2023</a:t>
             </a:fld>
             <a:endParaRPr lang="da-DK"/>
           </a:p>
@@ -597,7 +598,7 @@
           <a:p>
             <a:fld id="{E15B7D8E-2A20-4C0E-991C-872DBB7459A8}" type="datetimeFigureOut">
               <a:rPr lang="da-DK" smtClean="0"/>
-              <a:t>20-08-2022</a:t>
+              <a:t>20-08-2023</a:t>
             </a:fld>
             <a:endParaRPr lang="da-DK"/>
           </a:p>
@@ -765,7 +766,7 @@
           <a:p>
             <a:fld id="{E15B7D8E-2A20-4C0E-991C-872DBB7459A8}" type="datetimeFigureOut">
               <a:rPr lang="da-DK" smtClean="0"/>
-              <a:t>20-08-2022</a:t>
+              <a:t>20-08-2023</a:t>
             </a:fld>
             <a:endParaRPr lang="da-DK"/>
           </a:p>
@@ -1010,7 +1011,7 @@
           <a:p>
             <a:fld id="{E15B7D8E-2A20-4C0E-991C-872DBB7459A8}" type="datetimeFigureOut">
               <a:rPr lang="da-DK" smtClean="0"/>
-              <a:t>20-08-2022</a:t>
+              <a:t>20-08-2023</a:t>
             </a:fld>
             <a:endParaRPr lang="da-DK"/>
           </a:p>
@@ -1239,7 +1240,7 @@
           <a:p>
             <a:fld id="{E15B7D8E-2A20-4C0E-991C-872DBB7459A8}" type="datetimeFigureOut">
               <a:rPr lang="da-DK" smtClean="0"/>
-              <a:t>20-08-2022</a:t>
+              <a:t>20-08-2023</a:t>
             </a:fld>
             <a:endParaRPr lang="da-DK"/>
           </a:p>
@@ -1603,7 +1604,7 @@
           <a:p>
             <a:fld id="{E15B7D8E-2A20-4C0E-991C-872DBB7459A8}" type="datetimeFigureOut">
               <a:rPr lang="da-DK" smtClean="0"/>
-              <a:t>20-08-2022</a:t>
+              <a:t>20-08-2023</a:t>
             </a:fld>
             <a:endParaRPr lang="da-DK"/>
           </a:p>
@@ -1720,7 +1721,7 @@
           <a:p>
             <a:fld id="{E15B7D8E-2A20-4C0E-991C-872DBB7459A8}" type="datetimeFigureOut">
               <a:rPr lang="da-DK" smtClean="0"/>
-              <a:t>20-08-2022</a:t>
+              <a:t>20-08-2023</a:t>
             </a:fld>
             <a:endParaRPr lang="da-DK"/>
           </a:p>
@@ -1815,7 +1816,7 @@
           <a:p>
             <a:fld id="{E15B7D8E-2A20-4C0E-991C-872DBB7459A8}" type="datetimeFigureOut">
               <a:rPr lang="da-DK" smtClean="0"/>
-              <a:t>20-08-2022</a:t>
+              <a:t>20-08-2023</a:t>
             </a:fld>
             <a:endParaRPr lang="da-DK"/>
           </a:p>
@@ -2090,7 +2091,7 @@
           <a:p>
             <a:fld id="{E15B7D8E-2A20-4C0E-991C-872DBB7459A8}" type="datetimeFigureOut">
               <a:rPr lang="da-DK" smtClean="0"/>
-              <a:t>20-08-2022</a:t>
+              <a:t>20-08-2023</a:t>
             </a:fld>
             <a:endParaRPr lang="da-DK"/>
           </a:p>
@@ -2342,7 +2343,7 @@
           <a:p>
             <a:fld id="{E15B7D8E-2A20-4C0E-991C-872DBB7459A8}" type="datetimeFigureOut">
               <a:rPr lang="da-DK" smtClean="0"/>
-              <a:t>20-08-2022</a:t>
+              <a:t>20-08-2023</a:t>
             </a:fld>
             <a:endParaRPr lang="da-DK"/>
           </a:p>
@@ -2553,7 +2554,7 @@
           <a:p>
             <a:fld id="{E15B7D8E-2A20-4C0E-991C-872DBB7459A8}" type="datetimeFigureOut">
               <a:rPr lang="da-DK" smtClean="0"/>
-              <a:t>20-08-2022</a:t>
+              <a:t>20-08-2023</a:t>
             </a:fld>
             <a:endParaRPr lang="da-DK"/>
           </a:p>
@@ -3012,163 +3013,240 @@
       </p:grpSpPr>
       <p:sp>
         <p:nvSpPr>
-          <p:cNvPr id="2" name="Titel 1"/>
-          <p:cNvSpPr>
-            <a:spLocks noGrp="1"/>
-          </p:cNvSpPr>
-          <p:nvPr>
-            <p:ph type="title"/>
-          </p:nvPr>
-        </p:nvSpPr>
-        <p:spPr/>
-        <p:txBody>
-          <a:bodyPr/>
-          <a:lstStyle/>
-          <a:p>
-            <a:r>
-              <a:rPr lang="da-DK"/>
-              <a:t>Top to bottom…</a:t>
-            </a:r>
-          </a:p>
-        </p:txBody>
-      </p:sp>
-      <p:sp>
-        <p:nvSpPr>
-          <p:cNvPr id="3" name="Pladsholder til indhold 2"/>
-          <p:cNvSpPr>
-            <a:spLocks noGrp="1"/>
-          </p:cNvSpPr>
-          <p:nvPr>
-            <p:ph idx="1"/>
-          </p:nvPr>
-        </p:nvSpPr>
-        <p:spPr/>
-        <p:txBody>
-          <a:bodyPr/>
-          <a:lstStyle/>
-          <a:p>
-            <a:pPr marL="0" indent="0">
-              <a:buNone/>
-            </a:pPr>
-            <a:r>
-              <a:rPr lang="en-US"/>
-              <a:t>A </a:t>
-            </a:r>
-            <a:r>
-              <a:rPr lang="en-US" b="1"/>
-              <a:t>solution</a:t>
-            </a:r>
-            <a:r>
-              <a:rPr lang="en-US"/>
-              <a:t> contains a number of</a:t>
-            </a:r>
-            <a:endParaRPr lang="da-DK"/>
-          </a:p>
-          <a:p>
-            <a:pPr marL="0" indent="0">
-              <a:buNone/>
-            </a:pPr>
-            <a:r>
-              <a:rPr lang="en-US"/>
-              <a:t>	</a:t>
-            </a:r>
-            <a:r>
-              <a:rPr lang="en-US" b="1"/>
-              <a:t>projects</a:t>
-            </a:r>
-            <a:r>
-              <a:rPr lang="en-US"/>
-              <a:t>, that contain a number of</a:t>
-            </a:r>
-            <a:endParaRPr lang="da-DK"/>
-          </a:p>
-          <a:p>
-            <a:pPr marL="0" indent="0">
-              <a:buNone/>
-            </a:pPr>
-            <a:r>
-              <a:rPr lang="en-US"/>
-              <a:t>		</a:t>
-            </a:r>
-            <a:r>
-              <a:rPr lang="en-US" b="1"/>
-              <a:t>namespaces</a:t>
-            </a:r>
-            <a:r>
-              <a:rPr lang="en-US"/>
-              <a:t>, that contain a number of</a:t>
-            </a:r>
-            <a:endParaRPr lang="da-DK"/>
-          </a:p>
-          <a:p>
-            <a:pPr marL="0" indent="0">
-              <a:buNone/>
-            </a:pPr>
-            <a:r>
-              <a:rPr lang="en-US"/>
-              <a:t>			</a:t>
-            </a:r>
-            <a:r>
-              <a:rPr lang="en-US" b="1"/>
-              <a:t>classes</a:t>
-            </a:r>
-            <a:r>
-              <a:rPr lang="en-US"/>
-              <a:t>, that contain a number of</a:t>
-            </a:r>
-            <a:endParaRPr lang="da-DK"/>
-          </a:p>
-          <a:p>
-            <a:pPr marL="0" indent="0">
-              <a:buNone/>
-            </a:pPr>
-            <a:r>
-              <a:rPr lang="en-US"/>
-              <a:t>				</a:t>
-            </a:r>
-            <a:r>
-              <a:rPr lang="en-US" b="1"/>
-              <a:t>methods</a:t>
-            </a:r>
-            <a:r>
-              <a:rPr lang="en-US"/>
-              <a:t>, that contain a number of</a:t>
-            </a:r>
-            <a:endParaRPr lang="da-DK"/>
-          </a:p>
-          <a:p>
-            <a:pPr marL="0" indent="0">
-              <a:buNone/>
-            </a:pPr>
-            <a:r>
-              <a:rPr lang="en-US"/>
-              <a:t>					</a:t>
-            </a:r>
-            <a:r>
-              <a:rPr lang="en-US" b="1"/>
-              <a:t>statements</a:t>
-            </a:r>
-            <a:endParaRPr lang="da-DK"/>
+          <p:cNvPr id="7" name="Afrundet rektangel 6"/>
+          <p:cNvSpPr/>
+          <p:nvPr/>
+        </p:nvSpPr>
+        <p:spPr>
+          <a:xfrm>
+            <a:off x="558085" y="474373"/>
+            <a:ext cx="4168461" cy="5012030"/>
+          </a:xfrm>
+          <a:prstGeom prst="roundRect">
+            <a:avLst/>
+          </a:prstGeom>
+          <a:solidFill>
+            <a:schemeClr val="accent6">
+              <a:lumMod val="75000"/>
+            </a:schemeClr>
+          </a:solidFill>
+        </p:spPr>
+        <p:style>
+          <a:lnRef idx="2">
+            <a:schemeClr val="accent1">
+              <a:shade val="50000"/>
+            </a:schemeClr>
+          </a:lnRef>
+          <a:fillRef idx="1">
+            <a:schemeClr val="accent1"/>
+          </a:fillRef>
+          <a:effectRef idx="0">
+            <a:schemeClr val="accent1"/>
+          </a:effectRef>
+          <a:fontRef idx="minor">
+            <a:schemeClr val="lt1"/>
+          </a:fontRef>
+        </p:style>
+        <p:txBody>
+          <a:bodyPr rtlCol="0" anchor="t"/>
+          <a:lstStyle/>
+          <a:p>
+            <a:r>
+              <a:rPr lang="da-DK" sz="3200"/>
+              <a:t>Method</a:t>
+            </a:r>
+          </a:p>
+        </p:txBody>
+      </p:sp>
+      <p:sp>
+        <p:nvSpPr>
+          <p:cNvPr id="4" name="Afrundet rektangel 3"/>
+          <p:cNvSpPr/>
+          <p:nvPr/>
+        </p:nvSpPr>
+        <p:spPr>
+          <a:xfrm>
+            <a:off x="856445" y="1300767"/>
+            <a:ext cx="2730321" cy="766293"/>
+          </a:xfrm>
+          <a:prstGeom prst="roundRect">
+            <a:avLst/>
+          </a:prstGeom>
+        </p:spPr>
+        <p:style>
+          <a:lnRef idx="2">
+            <a:schemeClr val="accent1">
+              <a:shade val="50000"/>
+            </a:schemeClr>
+          </a:lnRef>
+          <a:fillRef idx="1">
+            <a:schemeClr val="accent1"/>
+          </a:fillRef>
+          <a:effectRef idx="0">
+            <a:schemeClr val="accent1"/>
+          </a:effectRef>
+          <a:fontRef idx="minor">
+            <a:schemeClr val="lt1"/>
+          </a:fontRef>
+        </p:style>
+        <p:txBody>
+          <a:bodyPr rtlCol="0" anchor="ctr"/>
+          <a:lstStyle/>
+          <a:p>
+            <a:pPr algn="ctr"/>
+            <a:r>
+              <a:rPr lang="da-DK" sz="3200"/>
+              <a:t>Statement</a:t>
+            </a:r>
+          </a:p>
+        </p:txBody>
+      </p:sp>
+      <p:sp>
+        <p:nvSpPr>
+          <p:cNvPr id="3" name="Afrundet rektangel 2"/>
+          <p:cNvSpPr/>
+          <p:nvPr/>
+        </p:nvSpPr>
+        <p:spPr>
+          <a:xfrm>
+            <a:off x="856445" y="2270976"/>
+            <a:ext cx="2730321" cy="766293"/>
+          </a:xfrm>
+          <a:prstGeom prst="roundRect">
+            <a:avLst/>
+          </a:prstGeom>
+        </p:spPr>
+        <p:style>
+          <a:lnRef idx="2">
+            <a:schemeClr val="accent1">
+              <a:shade val="50000"/>
+            </a:schemeClr>
+          </a:lnRef>
+          <a:fillRef idx="1">
+            <a:schemeClr val="accent1"/>
+          </a:fillRef>
+          <a:effectRef idx="0">
+            <a:schemeClr val="accent1"/>
+          </a:effectRef>
+          <a:fontRef idx="minor">
+            <a:schemeClr val="lt1"/>
+          </a:fontRef>
+        </p:style>
+        <p:txBody>
+          <a:bodyPr rtlCol="0" anchor="ctr"/>
+          <a:lstStyle/>
+          <a:p>
+            <a:pPr algn="ctr"/>
+            <a:r>
+              <a:rPr lang="da-DK" sz="3200"/>
+              <a:t>Statement</a:t>
+            </a:r>
+          </a:p>
+        </p:txBody>
+      </p:sp>
+      <p:sp>
+        <p:nvSpPr>
+          <p:cNvPr id="5" name="Afrundet rektangel 4"/>
+          <p:cNvSpPr/>
+          <p:nvPr/>
+        </p:nvSpPr>
+        <p:spPr>
+          <a:xfrm>
+            <a:off x="856445" y="3241185"/>
+            <a:ext cx="2730321" cy="766293"/>
+          </a:xfrm>
+          <a:prstGeom prst="roundRect">
+            <a:avLst/>
+          </a:prstGeom>
+        </p:spPr>
+        <p:style>
+          <a:lnRef idx="2">
+            <a:schemeClr val="accent1">
+              <a:shade val="50000"/>
+            </a:schemeClr>
+          </a:lnRef>
+          <a:fillRef idx="1">
+            <a:schemeClr val="accent1"/>
+          </a:fillRef>
+          <a:effectRef idx="0">
+            <a:schemeClr val="accent1"/>
+          </a:effectRef>
+          <a:fontRef idx="minor">
+            <a:schemeClr val="lt1"/>
+          </a:fontRef>
+        </p:style>
+        <p:txBody>
+          <a:bodyPr rtlCol="0" anchor="ctr"/>
+          <a:lstStyle/>
+          <a:p>
+            <a:pPr algn="ctr"/>
+            <a:r>
+              <a:rPr lang="da-DK" sz="3200"/>
+              <a:t>Statement</a:t>
+            </a:r>
+          </a:p>
+        </p:txBody>
+      </p:sp>
+      <p:sp>
+        <p:nvSpPr>
+          <p:cNvPr id="6" name="Afrundet rektangel 5"/>
+          <p:cNvSpPr/>
+          <p:nvPr/>
+        </p:nvSpPr>
+        <p:spPr>
+          <a:xfrm>
+            <a:off x="856444" y="4211394"/>
+            <a:ext cx="2730321" cy="766293"/>
+          </a:xfrm>
+          <a:prstGeom prst="roundRect">
+            <a:avLst/>
+          </a:prstGeom>
+        </p:spPr>
+        <p:style>
+          <a:lnRef idx="2">
+            <a:schemeClr val="accent1">
+              <a:shade val="50000"/>
+            </a:schemeClr>
+          </a:lnRef>
+          <a:fillRef idx="1">
+            <a:schemeClr val="accent1"/>
+          </a:fillRef>
+          <a:effectRef idx="0">
+            <a:schemeClr val="accent1"/>
+          </a:effectRef>
+          <a:fontRef idx="minor">
+            <a:schemeClr val="lt1"/>
+          </a:fontRef>
+        </p:style>
+        <p:txBody>
+          <a:bodyPr rtlCol="0" anchor="ctr"/>
+          <a:lstStyle/>
+          <a:p>
+            <a:pPr algn="ctr"/>
+            <a:r>
+              <a:rPr lang="da-DK" sz="3200"/>
+              <a:t>Statement</a:t>
+            </a:r>
           </a:p>
         </p:txBody>
       </p:sp>
     </p:spTree>
     <p:extLst>
       <p:ext uri="{BB962C8B-B14F-4D97-AF65-F5344CB8AC3E}">
-        <p14:creationId xmlns:p14="http://schemas.microsoft.com/office/powerpoint/2010/main" val="3197808938"/>
+        <p14:creationId xmlns:p14="http://schemas.microsoft.com/office/powerpoint/2010/main" val="2812269443"/>
       </p:ext>
     </p:extLst>
   </p:cSld>
   <p:clrMapOvr>
     <a:masterClrMapping/>
   </p:clrMapOvr>
-  <mc:AlternateContent xmlns:mc="http://schemas.openxmlformats.org/markup-compatibility/2006">
-    <mc:Choice xmlns:p14="http://schemas.microsoft.com/office/powerpoint/2010/main" Requires="p14">
+  <mc:AlternateContent xmlns:mc="http://schemas.openxmlformats.org/markup-compatibility/2006" xmlns:p14="http://schemas.microsoft.com/office/powerpoint/2010/main">
+    <mc:Choice Requires="p14">
       <p:transition spd="med" p14:dur="700">
         <p:fade/>
       </p:transition>
     </mc:Choice>
-    <mc:Fallback>
+    <mc:Fallback xmlns="">
       <p:transition spd="med">
         <p:fade/>
       </p:transition>
@@ -3211,6 +3289,190 @@
           <a:p>
             <a:r>
               <a:rPr lang="da-DK"/>
+              <a:t>Top to bottom…</a:t>
+            </a:r>
+          </a:p>
+        </p:txBody>
+      </p:sp>
+      <p:sp>
+        <p:nvSpPr>
+          <p:cNvPr id="3" name="Pladsholder til indhold 2"/>
+          <p:cNvSpPr>
+            <a:spLocks noGrp="1"/>
+          </p:cNvSpPr>
+          <p:nvPr>
+            <p:ph idx="1"/>
+          </p:nvPr>
+        </p:nvSpPr>
+        <p:spPr/>
+        <p:txBody>
+          <a:bodyPr/>
+          <a:lstStyle/>
+          <a:p>
+            <a:pPr marL="0" indent="0">
+              <a:buNone/>
+            </a:pPr>
+            <a:r>
+              <a:rPr lang="en-US"/>
+              <a:t>A </a:t>
+            </a:r>
+            <a:r>
+              <a:rPr lang="en-US" b="1"/>
+              <a:t>solution</a:t>
+            </a:r>
+            <a:r>
+              <a:rPr lang="en-US"/>
+              <a:t> contains a number of</a:t>
+            </a:r>
+            <a:endParaRPr lang="da-DK"/>
+          </a:p>
+          <a:p>
+            <a:pPr marL="0" indent="0">
+              <a:buNone/>
+            </a:pPr>
+            <a:r>
+              <a:rPr lang="en-US"/>
+              <a:t>	</a:t>
+            </a:r>
+            <a:r>
+              <a:rPr lang="en-US" b="1"/>
+              <a:t>projects</a:t>
+            </a:r>
+            <a:r>
+              <a:rPr lang="en-US"/>
+              <a:t>, that contain a number of</a:t>
+            </a:r>
+            <a:endParaRPr lang="da-DK"/>
+          </a:p>
+          <a:p>
+            <a:pPr marL="0" indent="0">
+              <a:buNone/>
+            </a:pPr>
+            <a:r>
+              <a:rPr lang="en-US"/>
+              <a:t>		</a:t>
+            </a:r>
+            <a:r>
+              <a:rPr lang="en-US" b="1"/>
+              <a:t>namespaces</a:t>
+            </a:r>
+            <a:r>
+              <a:rPr lang="en-US"/>
+              <a:t>, that contain a number of</a:t>
+            </a:r>
+            <a:endParaRPr lang="da-DK"/>
+          </a:p>
+          <a:p>
+            <a:pPr marL="0" indent="0">
+              <a:buNone/>
+            </a:pPr>
+            <a:r>
+              <a:rPr lang="en-US"/>
+              <a:t>			</a:t>
+            </a:r>
+            <a:r>
+              <a:rPr lang="en-US" b="1"/>
+              <a:t>classes</a:t>
+            </a:r>
+            <a:r>
+              <a:rPr lang="en-US"/>
+              <a:t>, that contain a number of</a:t>
+            </a:r>
+            <a:endParaRPr lang="da-DK"/>
+          </a:p>
+          <a:p>
+            <a:pPr marL="0" indent="0">
+              <a:buNone/>
+            </a:pPr>
+            <a:r>
+              <a:rPr lang="en-US"/>
+              <a:t>				</a:t>
+            </a:r>
+            <a:r>
+              <a:rPr lang="en-US" b="1"/>
+              <a:t>methods</a:t>
+            </a:r>
+            <a:r>
+              <a:rPr lang="en-US"/>
+              <a:t>, that contain a number of</a:t>
+            </a:r>
+            <a:endParaRPr lang="da-DK"/>
+          </a:p>
+          <a:p>
+            <a:pPr marL="0" indent="0">
+              <a:buNone/>
+            </a:pPr>
+            <a:r>
+              <a:rPr lang="en-US"/>
+              <a:t>					</a:t>
+            </a:r>
+            <a:r>
+              <a:rPr lang="en-US" b="1"/>
+              <a:t>statements</a:t>
+            </a:r>
+            <a:endParaRPr lang="da-DK"/>
+          </a:p>
+        </p:txBody>
+      </p:sp>
+    </p:spTree>
+    <p:extLst>
+      <p:ext uri="{BB962C8B-B14F-4D97-AF65-F5344CB8AC3E}">
+        <p14:creationId xmlns:p14="http://schemas.microsoft.com/office/powerpoint/2010/main" val="3197808938"/>
+      </p:ext>
+    </p:extLst>
+  </p:cSld>
+  <p:clrMapOvr>
+    <a:masterClrMapping/>
+  </p:clrMapOvr>
+  <mc:AlternateContent xmlns:mc="http://schemas.openxmlformats.org/markup-compatibility/2006" xmlns:p14="http://schemas.microsoft.com/office/powerpoint/2010/main">
+    <mc:Choice Requires="p14">
+      <p:transition spd="med" p14:dur="700">
+        <p:fade/>
+      </p:transition>
+    </mc:Choice>
+    <mc:Fallback xmlns="">
+      <p:transition spd="med">
+        <p:fade/>
+      </p:transition>
+    </mc:Fallback>
+  </mc:AlternateContent>
+</p:sld>
+</file>
+
+<file path=ppt/slides/slide12.xml><?xml version="1.0" encoding="utf-8"?>
+<p:sld xmlns:a="http://schemas.openxmlformats.org/drawingml/2006/main" xmlns:r="http://schemas.openxmlformats.org/officeDocument/2006/relationships" xmlns:p="http://schemas.openxmlformats.org/presentationml/2006/main">
+  <p:cSld>
+    <p:spTree>
+      <p:nvGrpSpPr>
+        <p:cNvPr id="1" name=""/>
+        <p:cNvGrpSpPr/>
+        <p:nvPr/>
+      </p:nvGrpSpPr>
+      <p:grpSpPr>
+        <a:xfrm>
+          <a:off x="0" y="0"/>
+          <a:ext cx="0" cy="0"/>
+          <a:chOff x="0" y="0"/>
+          <a:chExt cx="0" cy="0"/>
+        </a:xfrm>
+      </p:grpSpPr>
+      <p:sp>
+        <p:nvSpPr>
+          <p:cNvPr id="2" name="Titel 1"/>
+          <p:cNvSpPr>
+            <a:spLocks noGrp="1"/>
+          </p:cNvSpPr>
+          <p:nvPr>
+            <p:ph type="title"/>
+          </p:nvPr>
+        </p:nvSpPr>
+        <p:spPr/>
+        <p:txBody>
+          <a:bodyPr/>
+          <a:lstStyle/>
+          <a:p>
+            <a:r>
+              <a:rPr lang="da-DK"/>
               <a:t>Typical structure</a:t>
             </a:r>
           </a:p>
@@ -3366,13 +3628,13 @@
   <p:clrMapOvr>
     <a:masterClrMapping/>
   </p:clrMapOvr>
-  <mc:AlternateContent xmlns:mc="http://schemas.openxmlformats.org/markup-compatibility/2006">
-    <mc:Choice xmlns:p14="http://schemas.microsoft.com/office/powerpoint/2010/main" Requires="p14">
+  <mc:AlternateContent xmlns:mc="http://schemas.openxmlformats.org/markup-compatibility/2006" xmlns:p14="http://schemas.microsoft.com/office/powerpoint/2010/main">
+    <mc:Choice Requires="p14">
       <p:transition spd="med" p14:dur="700">
         <p:fade/>
       </p:transition>
     </mc:Choice>
-    <mc:Fallback>
+    <mc:Fallback xmlns="">
       <p:transition spd="med">
         <p:fade/>
       </p:transition>
@@ -3517,10 +3779,10 @@
       </p:sp>
       <p:pic>
         <p:nvPicPr>
-          <p:cNvPr id="5" name="Billede 4">
+          <p:cNvPr id="6" name="Billede 5">
             <a:extLst>
               <a:ext uri="{FF2B5EF4-FFF2-40B4-BE49-F238E27FC236}">
-                <a16:creationId xmlns:a16="http://schemas.microsoft.com/office/drawing/2014/main" id="{8BB616D9-6B8D-B33F-88E3-AE0186843B54}"/>
+                <a16:creationId xmlns:a16="http://schemas.microsoft.com/office/drawing/2014/main" id="{8BBA98A8-FA79-75D5-0581-D2D62CBD8A1A}"/>
               </a:ext>
             </a:extLst>
           </p:cNvPr>
@@ -3537,8 +3799,8 @@
         </p:blipFill>
         <p:spPr>
           <a:xfrm>
-            <a:off x="6990617" y="2322417"/>
-            <a:ext cx="5058463" cy="2850218"/>
+            <a:off x="6998474" y="1825625"/>
+            <a:ext cx="5015851" cy="3523128"/>
           </a:xfrm>
           <a:prstGeom prst="rect">
             <a:avLst/>
@@ -3555,13 +3817,13 @@
   <p:clrMapOvr>
     <a:masterClrMapping/>
   </p:clrMapOvr>
-  <mc:AlternateContent xmlns:mc="http://schemas.openxmlformats.org/markup-compatibility/2006">
-    <mc:Choice xmlns:p14="http://schemas.microsoft.com/office/powerpoint/2010/main" Requires="p14">
+  <mc:AlternateContent xmlns:mc="http://schemas.openxmlformats.org/markup-compatibility/2006" xmlns:p14="http://schemas.microsoft.com/office/powerpoint/2010/main">
+    <mc:Choice Requires="p14">
       <p:transition spd="med" p14:dur="700">
         <p:fade/>
       </p:transition>
     </mc:Choice>
-    <mc:Fallback>
+    <mc:Fallback xmlns="">
       <p:transition spd="med">
         <p:fade/>
       </p:transition>
@@ -3587,184 +3849,12 @@
           <a:chExt cx="0" cy="0"/>
         </a:xfrm>
       </p:grpSpPr>
-      <p:sp>
-        <p:nvSpPr>
-          <p:cNvPr id="2" name="Titel 1"/>
-          <p:cNvSpPr>
-            <a:spLocks noGrp="1"/>
-          </p:cNvSpPr>
-          <p:nvPr>
-            <p:ph type="title"/>
-          </p:nvPr>
-        </p:nvSpPr>
-        <p:spPr/>
-        <p:txBody>
-          <a:bodyPr/>
-          <a:lstStyle/>
-          <a:p>
-            <a:r>
-              <a:rPr lang="da-DK"/>
-              <a:t>Solution</a:t>
-            </a:r>
-          </a:p>
-        </p:txBody>
-      </p:sp>
-      <p:sp>
-        <p:nvSpPr>
-          <p:cNvPr id="3" name="Pladsholder til indhold 2"/>
-          <p:cNvSpPr>
-            <a:spLocks noGrp="1"/>
-          </p:cNvSpPr>
-          <p:nvPr>
-            <p:ph idx="1"/>
-          </p:nvPr>
-        </p:nvSpPr>
-        <p:spPr>
-          <a:xfrm>
-            <a:off x="838200" y="1825625"/>
-            <a:ext cx="6277303" cy="4351338"/>
-          </a:xfrm>
-        </p:spPr>
-        <p:txBody>
-          <a:bodyPr/>
-          <a:lstStyle/>
-          <a:p>
-            <a:r>
-              <a:rPr lang="da-DK" dirty="0"/>
-              <a:t>Top-</a:t>
-            </a:r>
-            <a:r>
-              <a:rPr lang="da-DK" dirty="0" err="1"/>
-              <a:t>level</a:t>
-            </a:r>
-            <a:r>
-              <a:rPr lang="da-DK" dirty="0"/>
-              <a:t> unit of organisation</a:t>
-            </a:r>
-          </a:p>
-          <a:p>
-            <a:r>
-              <a:rPr lang="da-DK" dirty="0"/>
-              <a:t>Holds </a:t>
-            </a:r>
-            <a:r>
-              <a:rPr lang="da-DK" dirty="0" err="1"/>
-              <a:t>together</a:t>
-            </a:r>
-            <a:r>
-              <a:rPr lang="da-DK" dirty="0"/>
-              <a:t> all elements of a </a:t>
-            </a:r>
-            <a:r>
-              <a:rPr lang="da-DK" dirty="0" err="1"/>
-              <a:t>complete</a:t>
-            </a:r>
-            <a:r>
-              <a:rPr lang="da-DK" dirty="0"/>
-              <a:t> solution</a:t>
-            </a:r>
-          </a:p>
-          <a:p>
-            <a:pPr lvl="1"/>
-            <a:r>
-              <a:rPr lang="da-DK" dirty="0"/>
-              <a:t>Clients</a:t>
-            </a:r>
-          </a:p>
-          <a:p>
-            <a:pPr lvl="1"/>
-            <a:r>
-              <a:rPr lang="da-DK" dirty="0"/>
-              <a:t>Servers</a:t>
-            </a:r>
-          </a:p>
-          <a:p>
-            <a:pPr lvl="1"/>
-            <a:r>
-              <a:rPr lang="da-DK" dirty="0"/>
-              <a:t>Mobile Apps</a:t>
-            </a:r>
-          </a:p>
-          <a:p>
-            <a:pPr lvl="1"/>
-            <a:r>
-              <a:rPr lang="da-DK" dirty="0"/>
-              <a:t>…</a:t>
-            </a:r>
-          </a:p>
-          <a:p>
-            <a:r>
-              <a:rPr lang="da-DK" dirty="0" err="1"/>
-              <a:t>Each</a:t>
-            </a:r>
-            <a:r>
-              <a:rPr lang="da-DK" dirty="0"/>
-              <a:t> element </a:t>
-            </a:r>
-            <a:r>
-              <a:rPr lang="da-DK" dirty="0" err="1"/>
-              <a:t>represented</a:t>
-            </a:r>
-            <a:r>
-              <a:rPr lang="da-DK" dirty="0"/>
-              <a:t> by a </a:t>
-            </a:r>
-            <a:r>
-              <a:rPr lang="da-DK" b="1" dirty="0" err="1"/>
-              <a:t>project</a:t>
-            </a:r>
-            <a:endParaRPr lang="da-DK" b="1" dirty="0"/>
-          </a:p>
-          <a:p>
-            <a:r>
-              <a:rPr lang="da-DK" dirty="0"/>
-              <a:t>Solution </a:t>
-            </a:r>
-            <a:r>
-              <a:rPr lang="da-DK" dirty="0" err="1"/>
-              <a:t>defined</a:t>
-            </a:r>
-            <a:r>
-              <a:rPr lang="da-DK" dirty="0"/>
-              <a:t> by </a:t>
-            </a:r>
-            <a:r>
-              <a:rPr lang="da-DK" dirty="0">
-                <a:solidFill>
-                  <a:srgbClr val="FF0000"/>
-                </a:solidFill>
-              </a:rPr>
-              <a:t>.</a:t>
-            </a:r>
-            <a:r>
-              <a:rPr lang="da-DK" dirty="0" err="1">
-                <a:solidFill>
-                  <a:srgbClr val="FF0000"/>
-                </a:solidFill>
-              </a:rPr>
-              <a:t>sln</a:t>
-            </a:r>
-            <a:r>
-              <a:rPr lang="da-DK" dirty="0">
-                <a:solidFill>
-                  <a:srgbClr val="FF0000"/>
-                </a:solidFill>
-              </a:rPr>
-              <a:t> </a:t>
-            </a:r>
-            <a:r>
-              <a:rPr lang="da-DK" dirty="0"/>
-              <a:t>file</a:t>
-            </a:r>
-          </a:p>
-        </p:txBody>
-      </p:sp>
       <p:pic>
         <p:nvPicPr>
-          <p:cNvPr id="4" name="Billede 3" descr="Et billede, der indeholder tekst&#10;&#10;Automatisk genereret beskrivelse">
+          <p:cNvPr id="7" name="Billede 6">
             <a:extLst>
               <a:ext uri="{FF2B5EF4-FFF2-40B4-BE49-F238E27FC236}">
-                <a16:creationId xmlns:a16="http://schemas.microsoft.com/office/drawing/2014/main" id="{FDB46B05-EAF4-BFEE-50B0-77FF6E46EC8D}"/>
+                <a16:creationId xmlns:a16="http://schemas.microsoft.com/office/drawing/2014/main" id="{E69DB46C-DA77-3508-E355-AD433265ED3A}"/>
               </a:ext>
             </a:extLst>
           </p:cNvPr>
@@ -3781,14 +3871,186 @@
         </p:blipFill>
         <p:spPr>
           <a:xfrm>
-            <a:off x="7718612" y="2105108"/>
-            <a:ext cx="3897012" cy="2547266"/>
+            <a:off x="7194176" y="1825625"/>
+            <a:ext cx="4701134" cy="2275728"/>
           </a:xfrm>
           <a:prstGeom prst="rect">
             <a:avLst/>
           </a:prstGeom>
         </p:spPr>
       </p:pic>
+      <p:sp>
+        <p:nvSpPr>
+          <p:cNvPr id="2" name="Titel 1"/>
+          <p:cNvSpPr>
+            <a:spLocks noGrp="1"/>
+          </p:cNvSpPr>
+          <p:nvPr>
+            <p:ph type="title"/>
+          </p:nvPr>
+        </p:nvSpPr>
+        <p:spPr/>
+        <p:txBody>
+          <a:bodyPr/>
+          <a:lstStyle/>
+          <a:p>
+            <a:r>
+              <a:rPr lang="da-DK"/>
+              <a:t>Solution</a:t>
+            </a:r>
+          </a:p>
+        </p:txBody>
+      </p:sp>
+      <p:sp>
+        <p:nvSpPr>
+          <p:cNvPr id="3" name="Pladsholder til indhold 2"/>
+          <p:cNvSpPr>
+            <a:spLocks noGrp="1"/>
+          </p:cNvSpPr>
+          <p:nvPr>
+            <p:ph idx="1"/>
+          </p:nvPr>
+        </p:nvSpPr>
+        <p:spPr>
+          <a:xfrm>
+            <a:off x="838200" y="1825625"/>
+            <a:ext cx="6277303" cy="4351338"/>
+          </a:xfrm>
+        </p:spPr>
+        <p:txBody>
+          <a:bodyPr/>
+          <a:lstStyle/>
+          <a:p>
+            <a:r>
+              <a:rPr lang="da-DK" dirty="0"/>
+              <a:t>Top-</a:t>
+            </a:r>
+            <a:r>
+              <a:rPr lang="da-DK" dirty="0" err="1"/>
+              <a:t>level</a:t>
+            </a:r>
+            <a:r>
+              <a:rPr lang="da-DK" dirty="0"/>
+              <a:t> unit of organisation</a:t>
+            </a:r>
+          </a:p>
+          <a:p>
+            <a:r>
+              <a:rPr lang="da-DK" dirty="0"/>
+              <a:t>Holds </a:t>
+            </a:r>
+            <a:r>
+              <a:rPr lang="da-DK" dirty="0" err="1"/>
+              <a:t>together</a:t>
+            </a:r>
+            <a:r>
+              <a:rPr lang="da-DK" dirty="0"/>
+              <a:t> all elements of a </a:t>
+            </a:r>
+            <a:r>
+              <a:rPr lang="da-DK" dirty="0" err="1"/>
+              <a:t>complete</a:t>
+            </a:r>
+            <a:r>
+              <a:rPr lang="da-DK" dirty="0"/>
+              <a:t> solution</a:t>
+            </a:r>
+          </a:p>
+          <a:p>
+            <a:pPr lvl="1"/>
+            <a:r>
+              <a:rPr lang="da-DK" dirty="0"/>
+              <a:t>Clients</a:t>
+            </a:r>
+          </a:p>
+          <a:p>
+            <a:pPr lvl="1"/>
+            <a:r>
+              <a:rPr lang="da-DK" dirty="0"/>
+              <a:t>Servers</a:t>
+            </a:r>
+          </a:p>
+          <a:p>
+            <a:pPr lvl="1"/>
+            <a:r>
+              <a:rPr lang="da-DK" dirty="0"/>
+              <a:t>Mobile Apps</a:t>
+            </a:r>
+          </a:p>
+          <a:p>
+            <a:pPr lvl="1"/>
+            <a:r>
+              <a:rPr lang="da-DK" dirty="0"/>
+              <a:t>…</a:t>
+            </a:r>
+          </a:p>
+          <a:p>
+            <a:r>
+              <a:rPr lang="da-DK" dirty="0" err="1"/>
+              <a:t>Each</a:t>
+            </a:r>
+            <a:r>
+              <a:rPr lang="da-DK" dirty="0"/>
+              <a:t> element </a:t>
+            </a:r>
+            <a:r>
+              <a:rPr lang="da-DK" dirty="0" err="1"/>
+              <a:t>represented</a:t>
+            </a:r>
+            <a:r>
+              <a:rPr lang="da-DK" dirty="0"/>
+              <a:t> by a </a:t>
+            </a:r>
+            <a:r>
+              <a:rPr lang="da-DK" b="1" dirty="0" err="1"/>
+              <a:t>project</a:t>
+            </a:r>
+            <a:endParaRPr lang="da-DK" b="1" dirty="0"/>
+          </a:p>
+          <a:p>
+            <a:r>
+              <a:rPr lang="da-DK" dirty="0"/>
+              <a:t>Solution </a:t>
+            </a:r>
+            <a:r>
+              <a:rPr lang="da-DK" dirty="0" err="1"/>
+              <a:t>defined</a:t>
+            </a:r>
+            <a:r>
+              <a:rPr lang="da-DK" dirty="0"/>
+              <a:t> by </a:t>
+            </a:r>
+            <a:r>
+              <a:rPr lang="da-DK" dirty="0">
+                <a:solidFill>
+                  <a:srgbClr val="FF0000"/>
+                </a:solidFill>
+              </a:rPr>
+              <a:t>.</a:t>
+            </a:r>
+            <a:r>
+              <a:rPr lang="da-DK" dirty="0" err="1">
+                <a:solidFill>
+                  <a:srgbClr val="FF0000"/>
+                </a:solidFill>
+              </a:rPr>
+              <a:t>sln</a:t>
+            </a:r>
+            <a:r>
+              <a:rPr lang="da-DK" dirty="0">
+                <a:solidFill>
+                  <a:srgbClr val="FF0000"/>
+                </a:solidFill>
+              </a:rPr>
+              <a:t> </a:t>
+            </a:r>
+            <a:r>
+              <a:rPr lang="da-DK" dirty="0"/>
+              <a:t>file</a:t>
+            </a:r>
+          </a:p>
+        </p:txBody>
+      </p:sp>
       <p:sp>
         <p:nvSpPr>
           <p:cNvPr id="5" name="Rektangel 4">
@@ -3803,8 +4065,8 @@
         </p:nvSpPr>
         <p:spPr>
           <a:xfrm>
-            <a:off x="7875766" y="3291840"/>
-            <a:ext cx="3271845" cy="318052"/>
+            <a:off x="7194176" y="2840560"/>
+            <a:ext cx="3341089" cy="318052"/>
           </a:xfrm>
           <a:prstGeom prst="rect">
             <a:avLst/>
@@ -3851,13 +4113,13 @@
   <p:clrMapOvr>
     <a:masterClrMapping/>
   </p:clrMapOvr>
-  <mc:AlternateContent xmlns:mc="http://schemas.openxmlformats.org/markup-compatibility/2006">
-    <mc:Choice xmlns:p14="http://schemas.microsoft.com/office/powerpoint/2010/main" Requires="p14">
+  <mc:AlternateContent xmlns:mc="http://schemas.openxmlformats.org/markup-compatibility/2006" xmlns:p14="http://schemas.microsoft.com/office/powerpoint/2010/main">
+    <mc:Choice Requires="p14">
       <p:transition spd="med" p14:dur="700">
         <p:fade/>
       </p:transition>
     </mc:Choice>
-    <mc:Fallback>
+    <mc:Fallback xmlns="">
       <p:transition spd="med">
         <p:fade/>
       </p:transition>
@@ -4159,10 +4421,10 @@
       </p:sp>
       <p:pic>
         <p:nvPicPr>
-          <p:cNvPr id="5" name="Billede 4" descr="Et billede, der indeholder tekst&#10;&#10;Automatisk genereret beskrivelse">
+          <p:cNvPr id="4" name="Billede 3">
             <a:extLst>
               <a:ext uri="{FF2B5EF4-FFF2-40B4-BE49-F238E27FC236}">
-                <a16:creationId xmlns:a16="http://schemas.microsoft.com/office/drawing/2014/main" id="{5E74A60F-E969-56F6-1C34-E99F7469A5C8}"/>
+                <a16:creationId xmlns:a16="http://schemas.microsoft.com/office/drawing/2014/main" id="{587888A7-949A-4457-2573-897F4AE79D4E}"/>
               </a:ext>
             </a:extLst>
           </p:cNvPr>
@@ -4179,8 +4441,8 @@
         </p:blipFill>
         <p:spPr>
           <a:xfrm>
-            <a:off x="7718612" y="2105108"/>
-            <a:ext cx="3897012" cy="2547266"/>
+            <a:off x="7194176" y="1825625"/>
+            <a:ext cx="4701134" cy="2275728"/>
           </a:xfrm>
           <a:prstGeom prst="rect">
             <a:avLst/>
@@ -4189,10 +4451,10 @@
       </p:pic>
       <p:sp>
         <p:nvSpPr>
-          <p:cNvPr id="6" name="Rektangel 5">
+          <p:cNvPr id="7" name="Rektangel 6">
             <a:extLst>
               <a:ext uri="{FF2B5EF4-FFF2-40B4-BE49-F238E27FC236}">
-                <a16:creationId xmlns:a16="http://schemas.microsoft.com/office/drawing/2014/main" id="{1547DF9B-2AFA-9BF5-0C47-4B527970EFC7}"/>
+                <a16:creationId xmlns:a16="http://schemas.microsoft.com/office/drawing/2014/main" id="{D9306273-F352-8744-CF6F-FACA9E6867B4}"/>
               </a:ext>
             </a:extLst>
           </p:cNvPr>
@@ -4201,8 +4463,8 @@
         </p:nvSpPr>
         <p:spPr>
           <a:xfrm>
-            <a:off x="7891669" y="3617843"/>
-            <a:ext cx="3271845" cy="353834"/>
+            <a:off x="7230034" y="3110948"/>
+            <a:ext cx="3341089" cy="318052"/>
           </a:xfrm>
           <a:prstGeom prst="rect">
             <a:avLst/>
@@ -4249,13 +4511,13 @@
   <p:clrMapOvr>
     <a:masterClrMapping/>
   </p:clrMapOvr>
-  <mc:AlternateContent xmlns:mc="http://schemas.openxmlformats.org/markup-compatibility/2006">
-    <mc:Choice xmlns:p14="http://schemas.microsoft.com/office/powerpoint/2010/main" Requires="p14">
+  <mc:AlternateContent xmlns:mc="http://schemas.openxmlformats.org/markup-compatibility/2006" xmlns:p14="http://schemas.microsoft.com/office/powerpoint/2010/main">
+    <mc:Choice Requires="p14">
       <p:transition spd="med" p14:dur="700">
         <p:fade/>
       </p:transition>
     </mc:Choice>
-    <mc:Fallback>
+    <mc:Fallback xmlns="">
       <p:transition spd="med">
         <p:fade/>
       </p:transition>
@@ -4295,7 +4557,7 @@
                                           </p:stCondLst>
                                         </p:cTn>
                                         <p:tgtEl>
-                                          <p:spTgt spid="6"/>
+                                          <p:spTgt spid="7"/>
                                         </p:tgtEl>
                                         <p:attrNameLst>
                                           <p:attrName>style.visibility</p:attrName>
@@ -4309,7 +4571,7 @@
                                       <p:cBhvr>
                                         <p:cTn id="7" dur="500"/>
                                         <p:tgtEl>
-                                          <p:spTgt spid="6"/>
+                                          <p:spTgt spid="7"/>
                                         </p:tgtEl>
                                       </p:cBhvr>
                                     </p:animEffect>
@@ -4344,7 +4606,7 @@
       </p:par>
     </p:tnLst>
     <p:bldLst>
-      <p:bldP spid="6" grpId="0" animBg="1"/>
+      <p:bldP spid="7" grpId="0" animBg="1"/>
     </p:bldLst>
   </p:timing>
 </p:sld>
@@ -4510,7 +4772,7 @@
               <a:t>.</a:t>
             </a:r>
             <a:r>
-              <a:rPr lang="da-DK" dirty="0" err="1">
+              <a:rPr lang="da-DK" err="1">
                 <a:solidFill>
                   <a:srgbClr val="FF0000"/>
                 </a:solidFill>
@@ -4518,9 +4780,32 @@
               <a:t>cs</a:t>
             </a:r>
             <a:r>
-              <a:rPr lang="da-DK" dirty="0"/>
+              <a:rPr lang="da-DK"/>
               <a:t> file</a:t>
             </a:r>
+          </a:p>
+          <a:p>
+            <a:r>
+              <a:rPr lang="da-DK" b="1">
+                <a:solidFill>
+                  <a:srgbClr val="FF0000"/>
+                </a:solidFill>
+              </a:rPr>
+              <a:t>NB</a:t>
+            </a:r>
+            <a:r>
+              <a:rPr lang="da-DK"/>
+              <a:t>: </a:t>
+            </a:r>
+            <a:r>
+              <a:rPr lang="da-DK" b="1"/>
+              <a:t>Program.cs </a:t>
+            </a:r>
+            <a:r>
+              <a:rPr lang="da-DK"/>
+              <a:t>is a special file, and does not (explicitly) contain a class definition…</a:t>
+            </a:r>
+            <a:endParaRPr lang="da-DK" dirty="0"/>
           </a:p>
           <a:p>
             <a:endParaRPr lang="da-DK" dirty="0"/>
@@ -4532,10 +4817,10 @@
       </p:sp>
       <p:pic>
         <p:nvPicPr>
-          <p:cNvPr id="4" name="Billede 3" descr="Et billede, der indeholder tekst&#10;&#10;Automatisk genereret beskrivelse">
+          <p:cNvPr id="6" name="Billede 5">
             <a:extLst>
               <a:ext uri="{FF2B5EF4-FFF2-40B4-BE49-F238E27FC236}">
-                <a16:creationId xmlns:a16="http://schemas.microsoft.com/office/drawing/2014/main" id="{31CB0454-254F-310D-A467-F553EC2C334A}"/>
+                <a16:creationId xmlns:a16="http://schemas.microsoft.com/office/drawing/2014/main" id="{4E918E48-063E-AE18-9ED1-1D401381B55E}"/>
               </a:ext>
             </a:extLst>
           </p:cNvPr>
@@ -4552,8 +4837,8 @@
         </p:blipFill>
         <p:spPr>
           <a:xfrm>
-            <a:off x="7718612" y="2105108"/>
-            <a:ext cx="3897012" cy="2547266"/>
+            <a:off x="7212106" y="1825625"/>
+            <a:ext cx="4701134" cy="2275728"/>
           </a:xfrm>
           <a:prstGeom prst="rect">
             <a:avLst/>
@@ -4562,10 +4847,10 @@
       </p:pic>
       <p:sp>
         <p:nvSpPr>
-          <p:cNvPr id="5" name="Rektangel 4">
+          <p:cNvPr id="7" name="Rektangel 6">
             <a:extLst>
               <a:ext uri="{FF2B5EF4-FFF2-40B4-BE49-F238E27FC236}">
-                <a16:creationId xmlns:a16="http://schemas.microsoft.com/office/drawing/2014/main" id="{3837422E-8973-9AD1-319E-A0572F19B365}"/>
+                <a16:creationId xmlns:a16="http://schemas.microsoft.com/office/drawing/2014/main" id="{C25219A8-F743-747E-8DE7-A1979F0D4F77}"/>
               </a:ext>
             </a:extLst>
           </p:cNvPr>
@@ -4574,8 +4859,8 @@
         </p:nvSpPr>
         <p:spPr>
           <a:xfrm>
-            <a:off x="7918563" y="4187102"/>
-            <a:ext cx="3271845" cy="353834"/>
+            <a:off x="7212106" y="3630901"/>
+            <a:ext cx="3341089" cy="318052"/>
           </a:xfrm>
           <a:prstGeom prst="rect">
             <a:avLst/>
@@ -4583,7 +4868,7 @@
           <a:noFill/>
           <a:ln w="76200">
             <a:solidFill>
-              <a:srgbClr val="FFCC99"/>
+              <a:srgbClr val="FF0000"/>
             </a:solidFill>
           </a:ln>
         </p:spPr>
@@ -4622,13 +4907,13 @@
   <p:clrMapOvr>
     <a:masterClrMapping/>
   </p:clrMapOvr>
-  <mc:AlternateContent xmlns:mc="http://schemas.openxmlformats.org/markup-compatibility/2006">
-    <mc:Choice xmlns:p14="http://schemas.microsoft.com/office/powerpoint/2010/main" Requires="p14">
+  <mc:AlternateContent xmlns:mc="http://schemas.openxmlformats.org/markup-compatibility/2006" xmlns:p14="http://schemas.microsoft.com/office/powerpoint/2010/main">
+    <mc:Choice Requires="p14">
       <p:transition spd="med" p14:dur="700">
         <p:fade/>
       </p:transition>
     </mc:Choice>
-    <mc:Fallback>
+    <mc:Fallback xmlns="">
       <p:transition spd="med">
         <p:fade/>
       </p:transition>
@@ -4668,7 +4953,7 @@
                                           </p:stCondLst>
                                         </p:cTn>
                                         <p:tgtEl>
-                                          <p:spTgt spid="5"/>
+                                          <p:spTgt spid="7"/>
                                         </p:tgtEl>
                                         <p:attrNameLst>
                                           <p:attrName>style.visibility</p:attrName>
@@ -4682,7 +4967,7 @@
                                       <p:cBhvr>
                                         <p:cTn id="7" dur="500"/>
                                         <p:tgtEl>
-                                          <p:spTgt spid="5"/>
+                                          <p:spTgt spid="7"/>
                                         </p:tgtEl>
                                       </p:cBhvr>
                                     </p:animEffect>
@@ -4717,7 +5002,7 @@
       </p:par>
     </p:tnLst>
     <p:bldLst>
-      <p:bldP spid="5" grpId="0" animBg="1"/>
+      <p:bldP spid="7" grpId="0" animBg="1"/>
     </p:bldLst>
   </p:timing>
 </p:sld>
@@ -4742,6 +5027,94 @@
       </p:grpSpPr>
       <p:sp>
         <p:nvSpPr>
+          <p:cNvPr id="2" name="Titel 1">
+            <a:extLst>
+              <a:ext uri="{FF2B5EF4-FFF2-40B4-BE49-F238E27FC236}">
+                <a16:creationId xmlns:a16="http://schemas.microsoft.com/office/drawing/2014/main" id="{4959E0D3-80D2-66F2-A103-B9860625DCD5}"/>
+              </a:ext>
+            </a:extLst>
+          </p:cNvPr>
+          <p:cNvSpPr>
+            <a:spLocks noGrp="1"/>
+          </p:cNvSpPr>
+          <p:nvPr>
+            <p:ph type="title"/>
+          </p:nvPr>
+        </p:nvSpPr>
+        <p:spPr/>
+        <p:txBody>
+          <a:bodyPr/>
+          <a:lstStyle/>
+          <a:p>
+            <a:r>
+              <a:rPr lang="da-DK"/>
+              <a:t>File structure</a:t>
+            </a:r>
+          </a:p>
+        </p:txBody>
+      </p:sp>
+      <p:pic>
+        <p:nvPicPr>
+          <p:cNvPr id="5" name="Billede 4">
+            <a:extLst>
+              <a:ext uri="{FF2B5EF4-FFF2-40B4-BE49-F238E27FC236}">
+                <a16:creationId xmlns:a16="http://schemas.microsoft.com/office/drawing/2014/main" id="{AEFAA563-FC70-BEE1-12BA-EFA669FA0E25}"/>
+              </a:ext>
+            </a:extLst>
+          </p:cNvPr>
+          <p:cNvPicPr>
+            <a:picLocks noChangeAspect="1"/>
+          </p:cNvPicPr>
+          <p:nvPr/>
+        </p:nvPicPr>
+        <p:blipFill>
+          <a:blip r:embed="rId2"/>
+          <a:stretch>
+            <a:fillRect/>
+          </a:stretch>
+        </p:blipFill>
+        <p:spPr>
+          <a:xfrm>
+            <a:off x="1081087" y="2238375"/>
+            <a:ext cx="10029825" cy="2381250"/>
+          </a:xfrm>
+          <a:prstGeom prst="rect">
+            <a:avLst/>
+          </a:prstGeom>
+        </p:spPr>
+      </p:pic>
+    </p:spTree>
+    <p:extLst>
+      <p:ext uri="{BB962C8B-B14F-4D97-AF65-F5344CB8AC3E}">
+        <p14:creationId xmlns:p14="http://schemas.microsoft.com/office/powerpoint/2010/main" val="3212569585"/>
+      </p:ext>
+    </p:extLst>
+  </p:cSld>
+  <p:clrMapOvr>
+    <a:masterClrMapping/>
+  </p:clrMapOvr>
+</p:sld>
+</file>
+
+<file path=ppt/slides/slide7.xml><?xml version="1.0" encoding="utf-8"?>
+<p:sld xmlns:a="http://schemas.openxmlformats.org/drawingml/2006/main" xmlns:r="http://schemas.openxmlformats.org/officeDocument/2006/relationships" xmlns:p="http://schemas.openxmlformats.org/presentationml/2006/main">
+  <p:cSld>
+    <p:spTree>
+      <p:nvGrpSpPr>
+        <p:cNvPr id="1" name=""/>
+        <p:cNvGrpSpPr/>
+        <p:nvPr/>
+      </p:nvGrpSpPr>
+      <p:grpSpPr>
+        <a:xfrm>
+          <a:off x="0" y="0"/>
+          <a:ext cx="0" cy="0"/>
+          <a:chOff x="0" y="0"/>
+          <a:chExt cx="0" cy="0"/>
+        </a:xfrm>
+      </p:grpSpPr>
+      <p:sp>
+        <p:nvSpPr>
           <p:cNvPr id="2" name="Titel 1"/>
           <p:cNvSpPr>
             <a:spLocks noGrp="1"/>
@@ -4995,13 +5368,13 @@
   <p:clrMapOvr>
     <a:masterClrMapping/>
   </p:clrMapOvr>
-  <mc:AlternateContent xmlns:mc="http://schemas.openxmlformats.org/markup-compatibility/2006">
-    <mc:Choice xmlns:p14="http://schemas.microsoft.com/office/powerpoint/2010/main" Requires="p14">
+  <mc:AlternateContent xmlns:mc="http://schemas.openxmlformats.org/markup-compatibility/2006" xmlns:p14="http://schemas.microsoft.com/office/powerpoint/2010/main">
+    <mc:Choice Requires="p14">
       <p:transition spd="med" p14:dur="700">
         <p:fade/>
       </p:transition>
     </mc:Choice>
-    <mc:Fallback>
+    <mc:Fallback xmlns="">
       <p:transition spd="med">
         <p:fade/>
       </p:transition>
@@ -5010,7 +5383,7 @@
 </p:sld>
 </file>
 
-<file path=ppt/slides/slide7.xml><?xml version="1.0" encoding="utf-8"?>
+<file path=ppt/slides/slide8.xml><?xml version="1.0" encoding="utf-8"?>
 <p:sld xmlns:a="http://schemas.openxmlformats.org/drawingml/2006/main" xmlns:r="http://schemas.openxmlformats.org/officeDocument/2006/relationships" xmlns:p="http://schemas.openxmlformats.org/presentationml/2006/main">
   <p:cSld>
     <p:spTree>
@@ -5276,13 +5649,13 @@
   <p:clrMapOvr>
     <a:masterClrMapping/>
   </p:clrMapOvr>
-  <mc:AlternateContent xmlns:mc="http://schemas.openxmlformats.org/markup-compatibility/2006">
-    <mc:Choice xmlns:p14="http://schemas.microsoft.com/office/powerpoint/2010/main" Requires="p14">
+  <mc:AlternateContent xmlns:mc="http://schemas.openxmlformats.org/markup-compatibility/2006" xmlns:p14="http://schemas.microsoft.com/office/powerpoint/2010/main">
+    <mc:Choice Requires="p14">
       <p:transition spd="med" p14:dur="700">
         <p:fade/>
       </p:transition>
     </mc:Choice>
-    <mc:Fallback>
+    <mc:Fallback xmlns="">
       <p:transition spd="med">
         <p:fade/>
       </p:transition>
@@ -5291,7 +5664,7 @@
 </p:sld>
 </file>
 
-<file path=ppt/slides/slide8.xml><?xml version="1.0" encoding="utf-8"?>
+<file path=ppt/slides/slide9.xml><?xml version="1.0" encoding="utf-8"?>
 <p:sld xmlns:a="http://schemas.openxmlformats.org/drawingml/2006/main" xmlns:r="http://schemas.openxmlformats.org/officeDocument/2006/relationships" xmlns:p="http://schemas.openxmlformats.org/presentationml/2006/main">
   <p:cSld>
     <p:spTree>
@@ -5557,274 +5930,13 @@
   <p:clrMapOvr>
     <a:masterClrMapping/>
   </p:clrMapOvr>
-  <mc:AlternateContent xmlns:mc="http://schemas.openxmlformats.org/markup-compatibility/2006">
-    <mc:Choice xmlns:p14="http://schemas.microsoft.com/office/powerpoint/2010/main" Requires="p14">
+  <mc:AlternateContent xmlns:mc="http://schemas.openxmlformats.org/markup-compatibility/2006" xmlns:p14="http://schemas.microsoft.com/office/powerpoint/2010/main">
+    <mc:Choice Requires="p14">
       <p:transition spd="med" p14:dur="700">
         <p:fade/>
       </p:transition>
     </mc:Choice>
-    <mc:Fallback>
-      <p:transition spd="med">
-        <p:fade/>
-      </p:transition>
-    </mc:Fallback>
-  </mc:AlternateContent>
-</p:sld>
-</file>
-
-<file path=ppt/slides/slide9.xml><?xml version="1.0" encoding="utf-8"?>
-<p:sld xmlns:a="http://schemas.openxmlformats.org/drawingml/2006/main" xmlns:r="http://schemas.openxmlformats.org/officeDocument/2006/relationships" xmlns:p="http://schemas.openxmlformats.org/presentationml/2006/main">
-  <p:cSld>
-    <p:spTree>
-      <p:nvGrpSpPr>
-        <p:cNvPr id="1" name=""/>
-        <p:cNvGrpSpPr/>
-        <p:nvPr/>
-      </p:nvGrpSpPr>
-      <p:grpSpPr>
-        <a:xfrm>
-          <a:off x="0" y="0"/>
-          <a:ext cx="0" cy="0"/>
-          <a:chOff x="0" y="0"/>
-          <a:chExt cx="0" cy="0"/>
-        </a:xfrm>
-      </p:grpSpPr>
-      <p:sp>
-        <p:nvSpPr>
-          <p:cNvPr id="7" name="Afrundet rektangel 6"/>
-          <p:cNvSpPr/>
-          <p:nvPr/>
-        </p:nvSpPr>
-        <p:spPr>
-          <a:xfrm>
-            <a:off x="558085" y="474373"/>
-            <a:ext cx="4168461" cy="5012030"/>
-          </a:xfrm>
-          <a:prstGeom prst="roundRect">
-            <a:avLst/>
-          </a:prstGeom>
-          <a:solidFill>
-            <a:schemeClr val="accent6">
-              <a:lumMod val="75000"/>
-            </a:schemeClr>
-          </a:solidFill>
-        </p:spPr>
-        <p:style>
-          <a:lnRef idx="2">
-            <a:schemeClr val="accent1">
-              <a:shade val="50000"/>
-            </a:schemeClr>
-          </a:lnRef>
-          <a:fillRef idx="1">
-            <a:schemeClr val="accent1"/>
-          </a:fillRef>
-          <a:effectRef idx="0">
-            <a:schemeClr val="accent1"/>
-          </a:effectRef>
-          <a:fontRef idx="minor">
-            <a:schemeClr val="lt1"/>
-          </a:fontRef>
-        </p:style>
-        <p:txBody>
-          <a:bodyPr rtlCol="0" anchor="t"/>
-          <a:lstStyle/>
-          <a:p>
-            <a:r>
-              <a:rPr lang="da-DK" sz="3200"/>
-              <a:t>Method</a:t>
-            </a:r>
-          </a:p>
-        </p:txBody>
-      </p:sp>
-      <p:sp>
-        <p:nvSpPr>
-          <p:cNvPr id="4" name="Afrundet rektangel 3"/>
-          <p:cNvSpPr/>
-          <p:nvPr/>
-        </p:nvSpPr>
-        <p:spPr>
-          <a:xfrm>
-            <a:off x="856445" y="1300767"/>
-            <a:ext cx="2730321" cy="766293"/>
-          </a:xfrm>
-          <a:prstGeom prst="roundRect">
-            <a:avLst/>
-          </a:prstGeom>
-        </p:spPr>
-        <p:style>
-          <a:lnRef idx="2">
-            <a:schemeClr val="accent1">
-              <a:shade val="50000"/>
-            </a:schemeClr>
-          </a:lnRef>
-          <a:fillRef idx="1">
-            <a:schemeClr val="accent1"/>
-          </a:fillRef>
-          <a:effectRef idx="0">
-            <a:schemeClr val="accent1"/>
-          </a:effectRef>
-          <a:fontRef idx="minor">
-            <a:schemeClr val="lt1"/>
-          </a:fontRef>
-        </p:style>
-        <p:txBody>
-          <a:bodyPr rtlCol="0" anchor="ctr"/>
-          <a:lstStyle/>
-          <a:p>
-            <a:pPr algn="ctr"/>
-            <a:r>
-              <a:rPr lang="da-DK" sz="3200"/>
-              <a:t>Statement</a:t>
-            </a:r>
-          </a:p>
-        </p:txBody>
-      </p:sp>
-      <p:sp>
-        <p:nvSpPr>
-          <p:cNvPr id="3" name="Afrundet rektangel 2"/>
-          <p:cNvSpPr/>
-          <p:nvPr/>
-        </p:nvSpPr>
-        <p:spPr>
-          <a:xfrm>
-            <a:off x="856445" y="2270976"/>
-            <a:ext cx="2730321" cy="766293"/>
-          </a:xfrm>
-          <a:prstGeom prst="roundRect">
-            <a:avLst/>
-          </a:prstGeom>
-        </p:spPr>
-        <p:style>
-          <a:lnRef idx="2">
-            <a:schemeClr val="accent1">
-              <a:shade val="50000"/>
-            </a:schemeClr>
-          </a:lnRef>
-          <a:fillRef idx="1">
-            <a:schemeClr val="accent1"/>
-          </a:fillRef>
-          <a:effectRef idx="0">
-            <a:schemeClr val="accent1"/>
-          </a:effectRef>
-          <a:fontRef idx="minor">
-            <a:schemeClr val="lt1"/>
-          </a:fontRef>
-        </p:style>
-        <p:txBody>
-          <a:bodyPr rtlCol="0" anchor="ctr"/>
-          <a:lstStyle/>
-          <a:p>
-            <a:pPr algn="ctr"/>
-            <a:r>
-              <a:rPr lang="da-DK" sz="3200"/>
-              <a:t>Statement</a:t>
-            </a:r>
-          </a:p>
-        </p:txBody>
-      </p:sp>
-      <p:sp>
-        <p:nvSpPr>
-          <p:cNvPr id="5" name="Afrundet rektangel 4"/>
-          <p:cNvSpPr/>
-          <p:nvPr/>
-        </p:nvSpPr>
-        <p:spPr>
-          <a:xfrm>
-            <a:off x="856445" y="3241185"/>
-            <a:ext cx="2730321" cy="766293"/>
-          </a:xfrm>
-          <a:prstGeom prst="roundRect">
-            <a:avLst/>
-          </a:prstGeom>
-        </p:spPr>
-        <p:style>
-          <a:lnRef idx="2">
-            <a:schemeClr val="accent1">
-              <a:shade val="50000"/>
-            </a:schemeClr>
-          </a:lnRef>
-          <a:fillRef idx="1">
-            <a:schemeClr val="accent1"/>
-          </a:fillRef>
-          <a:effectRef idx="0">
-            <a:schemeClr val="accent1"/>
-          </a:effectRef>
-          <a:fontRef idx="minor">
-            <a:schemeClr val="lt1"/>
-          </a:fontRef>
-        </p:style>
-        <p:txBody>
-          <a:bodyPr rtlCol="0" anchor="ctr"/>
-          <a:lstStyle/>
-          <a:p>
-            <a:pPr algn="ctr"/>
-            <a:r>
-              <a:rPr lang="da-DK" sz="3200"/>
-              <a:t>Statement</a:t>
-            </a:r>
-          </a:p>
-        </p:txBody>
-      </p:sp>
-      <p:sp>
-        <p:nvSpPr>
-          <p:cNvPr id="6" name="Afrundet rektangel 5"/>
-          <p:cNvSpPr/>
-          <p:nvPr/>
-        </p:nvSpPr>
-        <p:spPr>
-          <a:xfrm>
-            <a:off x="856444" y="4211394"/>
-            <a:ext cx="2730321" cy="766293"/>
-          </a:xfrm>
-          <a:prstGeom prst="roundRect">
-            <a:avLst/>
-          </a:prstGeom>
-        </p:spPr>
-        <p:style>
-          <a:lnRef idx="2">
-            <a:schemeClr val="accent1">
-              <a:shade val="50000"/>
-            </a:schemeClr>
-          </a:lnRef>
-          <a:fillRef idx="1">
-            <a:schemeClr val="accent1"/>
-          </a:fillRef>
-          <a:effectRef idx="0">
-            <a:schemeClr val="accent1"/>
-          </a:effectRef>
-          <a:fontRef idx="minor">
-            <a:schemeClr val="lt1"/>
-          </a:fontRef>
-        </p:style>
-        <p:txBody>
-          <a:bodyPr rtlCol="0" anchor="ctr"/>
-          <a:lstStyle/>
-          <a:p>
-            <a:pPr algn="ctr"/>
-            <a:r>
-              <a:rPr lang="da-DK" sz="3200"/>
-              <a:t>Statement</a:t>
-            </a:r>
-          </a:p>
-        </p:txBody>
-      </p:sp>
-    </p:spTree>
-    <p:extLst>
-      <p:ext uri="{BB962C8B-B14F-4D97-AF65-F5344CB8AC3E}">
-        <p14:creationId xmlns:p14="http://schemas.microsoft.com/office/powerpoint/2010/main" val="2812269443"/>
-      </p:ext>
-    </p:extLst>
-  </p:cSld>
-  <p:clrMapOvr>
-    <a:masterClrMapping/>
-  </p:clrMapOvr>
-  <mc:AlternateContent xmlns:mc="http://schemas.openxmlformats.org/markup-compatibility/2006">
-    <mc:Choice xmlns:p14="http://schemas.microsoft.com/office/powerpoint/2010/main" Requires="p14">
-      <p:transition spd="med" p14:dur="700">
-        <p:fade/>
-      </p:transition>
-    </mc:Choice>
-    <mc:Fallback>
+    <mc:Fallback xmlns="">
       <p:transition spd="med">
         <p:fade/>
       </p:transition>

</xml_diff>